<commit_message>
update week3 and week4 materials
</commit_message>
<xml_diff>
--- a/week3/week3_slides.pptx
+++ b/week3/week3_slides.pptx
@@ -6,10 +6,10 @@
     <p:sldMasterId id="2147483651" r:id="rId3"/>
   </p:sldMasterIdLst>
   <p:notesMasterIdLst>
-    <p:notesMasterId r:id="rId28"/>
+    <p:notesMasterId r:id="rId29"/>
   </p:notesMasterIdLst>
   <p:handoutMasterIdLst>
-    <p:handoutMasterId r:id="rId29"/>
+    <p:handoutMasterId r:id="rId30"/>
   </p:handoutMasterIdLst>
   <p:sldIdLst>
     <p:sldId id="256" r:id="rId4"/>
@@ -34,8 +34,9 @@
     <p:sldId id="378" r:id="rId23"/>
     <p:sldId id="466" r:id="rId24"/>
     <p:sldId id="381" r:id="rId25"/>
-    <p:sldId id="457" r:id="rId26"/>
-    <p:sldId id="289" r:id="rId27"/>
+    <p:sldId id="470" r:id="rId26"/>
+    <p:sldId id="457" r:id="rId27"/>
+    <p:sldId id="289" r:id="rId28"/>
   </p:sldIdLst>
   <p:sldSz cx="12192000" cy="6858000"/>
   <p:notesSz cx="6858000" cy="9144000"/>
@@ -6414,8 +6415,9 @@
                 </a:solidFill>
                 <a:latin typeface="Microsoft YaHei" panose="020B0503020204020204" pitchFamily="34" charset="-122"/>
                 <a:ea typeface="Microsoft YaHei" panose="020B0503020204020204" pitchFamily="34" charset="-122"/>
+                <a:sym typeface="+mn-ea"/>
               </a:rPr>
-              <a:t>Week1 Recap</a:t>
+              <a:t>Data Structure</a:t>
             </a:r>
             <a:endParaRPr lang="en-US" altLang="zh-CN" sz="3200" b="1" dirty="0">
               <a:solidFill>
@@ -11465,6 +11467,373 @@
                 <a:cs typeface="+mn-cs"/>
                 <a:sym typeface="+mn-ea"/>
               </a:rPr>
+              <a:t>First Unique Character in String</a:t>
+            </a:r>
+            <a:endParaRPr kumimoji="0" lang="en-US" altLang="zh-CN" sz="2800" b="1" i="0" u="none" strike="noStrike" kern="1200" cap="none" spc="0" normalizeH="0" baseline="0" noProof="0" dirty="0">
+              <a:ln>
+                <a:noFill/>
+              </a:ln>
+              <a:solidFill>
+                <a:schemeClr val="tx1">
+                  <a:lumMod val="85000"/>
+                  <a:lumOff val="15000"/>
+                </a:schemeClr>
+              </a:solidFill>
+              <a:effectLst/>
+              <a:uLnTx/>
+              <a:uFillTx/>
+              <a:latin typeface="Microsoft YaHei" panose="020B0503020204020204" pitchFamily="34" charset="-122"/>
+              <a:ea typeface="Microsoft YaHei" panose="020B0503020204020204" pitchFamily="34" charset="-122"/>
+              <a:cs typeface="+mn-cs"/>
+              <a:sym typeface="+mn-ea"/>
+            </a:endParaRPr>
+          </a:p>
+        </p:txBody>
+      </p:sp>
+      <p:sp>
+        <p:nvSpPr>
+          <p:cNvPr id="3" name="Content Placeholder 2"/>
+          <p:cNvSpPr/>
+          <p:nvPr>
+            <p:ph idx="1"/>
+          </p:nvPr>
+        </p:nvSpPr>
+        <p:spPr>
+          <a:xfrm>
+            <a:off x="890905" y="1183640"/>
+            <a:ext cx="10515600" cy="4351338"/>
+          </a:xfrm>
+        </p:spPr>
+        <p:txBody>
+          <a:bodyPr/>
+          <a:p>
+            <a:r>
+              <a:rPr lang="en-US"/>
+              <a:t>Given a string s, find the first non-repeating character in it and return its index. If it does not exist, return -1.</a:t>
+            </a:r>
+            <a:endParaRPr lang="en-US"/>
+          </a:p>
+          <a:p>
+            <a:r>
+              <a:rPr lang="en-US"/>
+              <a:t>Example:</a:t>
+            </a:r>
+            <a:endParaRPr lang="en-US"/>
+          </a:p>
+          <a:p>
+            <a:pPr lvl="1"/>
+            <a:r>
+              <a:rPr lang="en-US"/>
+              <a:t>Input: s = "leetcode", Output: 0</a:t>
+            </a:r>
+            <a:endParaRPr lang="en-US"/>
+          </a:p>
+          <a:p>
+            <a:pPr lvl="1"/>
+            <a:r>
+              <a:rPr lang="en-US"/>
+              <a:t>Input: s = "loveleetcode", Output: 2</a:t>
+            </a:r>
+            <a:endParaRPr lang="en-US"/>
+          </a:p>
+          <a:p>
+            <a:pPr lvl="1"/>
+            <a:r>
+              <a:rPr lang="en-US"/>
+              <a:t>Input: s = "aabb", Output: -1</a:t>
+            </a:r>
+            <a:endParaRPr lang="en-US"/>
+          </a:p>
+        </p:txBody>
+      </p:sp>
+    </p:spTree>
+  </p:cSld>
+  <p:clrMapOvr>
+    <a:masterClrMapping/>
+  </p:clrMapOvr>
+  <p:transition spd="slow">
+    <p:wipe/>
+  </p:transition>
+</p:sld>
+</file>
+
+<file path=ppt/slides/slide24.xml><?xml version="1.0" encoding="utf-8"?>
+<p:sld xmlns:a="http://schemas.openxmlformats.org/drawingml/2006/main" xmlns:r="http://schemas.openxmlformats.org/officeDocument/2006/relationships" xmlns:p="http://schemas.openxmlformats.org/presentationml/2006/main">
+  <p:cSld>
+    <p:spTree>
+      <p:nvGrpSpPr>
+        <p:cNvPr id="1" name=""/>
+        <p:cNvGrpSpPr/>
+        <p:nvPr/>
+      </p:nvGrpSpPr>
+      <p:grpSpPr/>
+      <p:sp>
+        <p:nvSpPr>
+          <p:cNvPr id="15" name="任意多边形 14"/>
+          <p:cNvSpPr/>
+          <p:nvPr/>
+        </p:nvSpPr>
+        <p:spPr>
+          <a:xfrm>
+            <a:off x="0" y="274638"/>
+            <a:ext cx="890588" cy="639763"/>
+          </a:xfrm>
+          <a:custGeom>
+            <a:avLst/>
+            <a:gdLst>
+              <a:gd name="connsiteX0" fmla="*/ 0 w 1029743"/>
+              <a:gd name="connsiteY0" fmla="*/ 0 h 739718"/>
+              <a:gd name="connsiteX1" fmla="*/ 659884 w 1029743"/>
+              <a:gd name="connsiteY1" fmla="*/ 0 h 739718"/>
+              <a:gd name="connsiteX2" fmla="*/ 1029743 w 1029743"/>
+              <a:gd name="connsiteY2" fmla="*/ 369859 h 739718"/>
+              <a:gd name="connsiteX3" fmla="*/ 659884 w 1029743"/>
+              <a:gd name="connsiteY3" fmla="*/ 739718 h 739718"/>
+              <a:gd name="connsiteX4" fmla="*/ 0 w 1029743"/>
+              <a:gd name="connsiteY4" fmla="*/ 739718 h 739718"/>
+            </a:gdLst>
+            <a:ahLst/>
+            <a:cxnLst>
+              <a:cxn ang="0">
+                <a:pos x="connsiteX0" y="connsiteY0"/>
+              </a:cxn>
+              <a:cxn ang="0">
+                <a:pos x="connsiteX1" y="connsiteY1"/>
+              </a:cxn>
+              <a:cxn ang="0">
+                <a:pos x="connsiteX2" y="connsiteY2"/>
+              </a:cxn>
+              <a:cxn ang="0">
+                <a:pos x="connsiteX3" y="connsiteY3"/>
+              </a:cxn>
+              <a:cxn ang="0">
+                <a:pos x="connsiteX4" y="connsiteY4"/>
+              </a:cxn>
+            </a:cxnLst>
+            <a:rect l="l" t="t" r="r" b="b"/>
+            <a:pathLst>
+              <a:path w="1029743" h="739718">
+                <a:moveTo>
+                  <a:pt x="0" y="0"/>
+                </a:moveTo>
+                <a:lnTo>
+                  <a:pt x="659884" y="0"/>
+                </a:lnTo>
+                <a:cubicBezTo>
+                  <a:pt x="864151" y="0"/>
+                  <a:pt x="1029743" y="165592"/>
+                  <a:pt x="1029743" y="369859"/>
+                </a:cubicBezTo>
+                <a:cubicBezTo>
+                  <a:pt x="1029743" y="574126"/>
+                  <a:pt x="864151" y="739718"/>
+                  <a:pt x="659884" y="739718"/>
+                </a:cubicBezTo>
+                <a:lnTo>
+                  <a:pt x="0" y="739718"/>
+                </a:lnTo>
+                <a:close/>
+              </a:path>
+            </a:pathLst>
+          </a:custGeom>
+          <a:solidFill>
+            <a:srgbClr val="05B780"/>
+          </a:solidFill>
+          <a:ln>
+            <a:noFill/>
+          </a:ln>
+        </p:spPr>
+        <p:style>
+          <a:lnRef idx="2">
+            <a:schemeClr val="accent1">
+              <a:shade val="50000"/>
+            </a:schemeClr>
+          </a:lnRef>
+          <a:fillRef idx="1">
+            <a:schemeClr val="accent1"/>
+          </a:fillRef>
+          <a:effectRef idx="0">
+            <a:schemeClr val="accent1"/>
+          </a:effectRef>
+          <a:fontRef idx="minor">
+            <a:schemeClr val="lt1"/>
+          </a:fontRef>
+        </p:style>
+        <p:txBody>
+          <a:bodyPr anchor="ctr"/>
+          <a:lstStyle/>
+          <a:p>
+            <a:pPr marL="0" marR="0" lvl="0" indent="0" algn="ctr" defTabSz="914400" rtl="0" eaLnBrk="1" fontAlgn="auto" latinLnBrk="0" hangingPunct="1">
+              <a:lnSpc>
+                <a:spcPct val="100000"/>
+              </a:lnSpc>
+              <a:spcBef>
+                <a:spcPts val="0"/>
+              </a:spcBef>
+              <a:spcAft>
+                <a:spcPts val="0"/>
+              </a:spcAft>
+              <a:buClrTx/>
+              <a:buSzTx/>
+              <a:buFontTx/>
+              <a:buNone/>
+              <a:defRPr/>
+            </a:pPr>
+            <a:endParaRPr kumimoji="0" lang="zh-CN" altLang="en-US" sz="1800" b="0" i="0" u="none" strike="noStrike" kern="1200" cap="none" spc="0" normalizeH="0" baseline="0" noProof="0">
+              <a:ln>
+                <a:noFill/>
+              </a:ln>
+              <a:solidFill>
+                <a:schemeClr val="bg1"/>
+              </a:solidFill>
+              <a:effectLst/>
+              <a:uLnTx/>
+              <a:uFillTx/>
+              <a:latin typeface="+mn-lt"/>
+              <a:ea typeface="+mn-ea"/>
+              <a:cs typeface="+mn-cs"/>
+            </a:endParaRPr>
+          </a:p>
+        </p:txBody>
+      </p:sp>
+      <p:sp>
+        <p:nvSpPr>
+          <p:cNvPr id="7170" name="文本框 156"/>
+          <p:cNvSpPr txBox="1"/>
+          <p:nvPr/>
+        </p:nvSpPr>
+        <p:spPr>
+          <a:xfrm>
+            <a:off x="0" y="350838"/>
+            <a:ext cx="814388" cy="521970"/>
+          </a:xfrm>
+          <a:prstGeom prst="rect">
+            <a:avLst/>
+          </a:prstGeom>
+          <a:noFill/>
+          <a:ln w="9525">
+            <a:noFill/>
+          </a:ln>
+        </p:spPr>
+        <p:txBody>
+          <a:bodyPr anchor="t" anchorCtr="0">
+            <a:spAutoFit/>
+          </a:bodyPr>
+          <a:p>
+            <a:pPr>
+              <a:buFont typeface="Arial" panose="020B0604020202020204" pitchFamily="34" charset="0"/>
+            </a:pPr>
+            <a:r>
+              <a:rPr lang="en-US" altLang="zh-CN" sz="2800" b="1" dirty="0">
+                <a:solidFill>
+                  <a:schemeClr val="bg1"/>
+                </a:solidFill>
+                <a:latin typeface="Microsoft YaHei" panose="020B0503020204020204" pitchFamily="34" charset="-122"/>
+                <a:ea typeface="Microsoft YaHei" panose="020B0503020204020204" pitchFamily="34" charset="-122"/>
+              </a:rPr>
+              <a:t>4.4</a:t>
+            </a:r>
+            <a:endParaRPr lang="en-US" altLang="zh-CN" sz="2800" b="1" dirty="0">
+              <a:solidFill>
+                <a:schemeClr val="bg1"/>
+              </a:solidFill>
+              <a:latin typeface="Microsoft YaHei" panose="020B0503020204020204" pitchFamily="34" charset="-122"/>
+              <a:ea typeface="Microsoft YaHei" panose="020B0503020204020204" pitchFamily="34" charset="-122"/>
+            </a:endParaRPr>
+          </a:p>
+        </p:txBody>
+      </p:sp>
+      <p:sp>
+        <p:nvSpPr>
+          <p:cNvPr id="16" name="Rectangle 6"/>
+          <p:cNvSpPr>
+            <a:spLocks noChangeArrowheads="1"/>
+          </p:cNvSpPr>
+          <p:nvPr/>
+        </p:nvSpPr>
+        <p:spPr bwMode="black">
+          <a:xfrm>
+            <a:off x="1021080" y="334010"/>
+            <a:ext cx="8777605" cy="521970"/>
+          </a:xfrm>
+          <a:prstGeom prst="rect">
+            <a:avLst/>
+          </a:prstGeom>
+          <a:noFill/>
+          <a:ln>
+            <a:noFill/>
+          </a:ln>
+          <a:effectLst/>
+          <a:extLst>
+            <a:ext uri="{909E8E84-426E-40DD-AFC4-6F175D3DCCD1}">
+              <a14:hiddenFill xmlns:a14="http://schemas.microsoft.com/office/drawing/2010/main">
+                <a:solidFill>
+                  <a:schemeClr val="accent1"/>
+                </a:solidFill>
+              </a14:hiddenFill>
+            </a:ext>
+            <a:ext uri="{91240B29-F687-4F45-9708-019B960494DF}">
+              <a14:hiddenLine xmlns:a14="http://schemas.microsoft.com/office/drawing/2010/main" w="9525">
+                <a:solidFill>
+                  <a:schemeClr val="tx1"/>
+                </a:solidFill>
+                <a:miter lim="800000"/>
+                <a:headEnd/>
+                <a:tailEnd/>
+              </a14:hiddenLine>
+            </a:ext>
+            <a:ext uri="{AF507438-7753-43E0-B8FC-AC1667EBCBE1}">
+              <a14:hiddenEffects xmlns:a14="http://schemas.microsoft.com/office/drawing/2010/main">
+                <a:effectLst>
+                  <a:outerShdw dist="35921" dir="2700000" algn="ctr" rotWithShape="0">
+                    <a:schemeClr val="bg2"/>
+                  </a:outerShdw>
+                </a:effectLst>
+              </a14:hiddenEffects>
+            </a:ext>
+          </a:extLst>
+        </p:spPr>
+        <p:txBody>
+          <a:bodyPr wrap="square">
+            <a:spAutoFit/>
+          </a:bodyPr>
+          <a:lstStyle/>
+          <a:p>
+            <a:pPr marL="0" marR="0" lvl="0" indent="0" algn="l" defTabSz="914400" rtl="0" eaLnBrk="0" fontAlgn="auto" latinLnBrk="0" hangingPunct="0">
+              <a:lnSpc>
+                <a:spcPct val="100000"/>
+              </a:lnSpc>
+              <a:spcBef>
+                <a:spcPts val="0"/>
+              </a:spcBef>
+              <a:spcAft>
+                <a:spcPts val="0"/>
+              </a:spcAft>
+              <a:buClrTx/>
+              <a:buSzTx/>
+              <a:buFontTx/>
+              <a:buNone/>
+              <a:defRPr/>
+            </a:pPr>
+            <a:r>
+              <a:rPr kumimoji="0" lang="en-US" altLang="zh-CN" sz="2800" b="1" i="0" u="none" strike="noStrike" kern="1200" cap="none" spc="0" normalizeH="0" baseline="0" noProof="0" dirty="0">
+                <a:ln>
+                  <a:noFill/>
+                </a:ln>
+                <a:solidFill>
+                  <a:schemeClr val="tx1">
+                    <a:lumMod val="85000"/>
+                    <a:lumOff val="15000"/>
+                  </a:schemeClr>
+                </a:solidFill>
+                <a:effectLst/>
+                <a:uLnTx/>
+                <a:uFillTx/>
+                <a:latin typeface="Microsoft YaHei" panose="020B0503020204020204" pitchFamily="34" charset="-122"/>
+                <a:ea typeface="Microsoft YaHei" panose="020B0503020204020204" pitchFamily="34" charset="-122"/>
+                <a:cs typeface="+mn-cs"/>
+                <a:sym typeface="+mn-ea"/>
+              </a:rPr>
               <a:t>Homework</a:t>
             </a:r>
             <a:endParaRPr kumimoji="0" lang="en-US" altLang="zh-CN" sz="2800" b="1" i="0" u="none" strike="noStrike" kern="1200" cap="none" spc="0" normalizeH="0" baseline="0" noProof="0" dirty="0">
@@ -11569,7 +11938,7 @@
 </p:sld>
 </file>
 
-<file path=ppt/slides/slide24.xml><?xml version="1.0" encoding="utf-8"?>
+<file path=ppt/slides/slide25.xml><?xml version="1.0" encoding="utf-8"?>
 <p:sld xmlns:a="http://schemas.openxmlformats.org/drawingml/2006/main" xmlns:r="http://schemas.openxmlformats.org/officeDocument/2006/relationships" xmlns:p="http://schemas.openxmlformats.org/presentationml/2006/main">
   <p:cSld>
     <p:spTree>
@@ -12963,7 +13332,7 @@
                 <a:latin typeface="Microsoft YaHei" panose="020B0503020204020204" pitchFamily="34" charset="-122"/>
                 <a:ea typeface="Microsoft YaHei" panose="020B0503020204020204" pitchFamily="34" charset="-122"/>
               </a:rPr>
-              <a:t>Week1 Recap</a:t>
+              <a:t>Week2 Recap</a:t>
             </a:r>
             <a:endParaRPr lang="en-US" altLang="zh-CN" sz="3200" b="1" dirty="0">
               <a:solidFill>
@@ -13791,7 +14160,7 @@
                 <a:latin typeface="Microsoft YaHei" panose="020B0503020204020204" pitchFamily="34" charset="-122"/>
                 <a:ea typeface="Microsoft YaHei" panose="020B0503020204020204" pitchFamily="34" charset="-122"/>
               </a:rPr>
-              <a:t>Week1 Recap</a:t>
+              <a:t>Week2 Recap</a:t>
             </a:r>
             <a:endParaRPr lang="en-US" altLang="zh-CN" sz="3200" b="1" dirty="0">
               <a:solidFill>
@@ -14673,7 +15042,7 @@
                 <a:latin typeface="Microsoft YaHei" panose="020B0503020204020204" pitchFamily="34" charset="-122"/>
                 <a:ea typeface="Microsoft YaHei" panose="020B0503020204020204" pitchFamily="34" charset="-122"/>
               </a:rPr>
-              <a:t>Week1 Recap</a:t>
+              <a:t>Data Structure</a:t>
             </a:r>
             <a:endParaRPr lang="en-US" altLang="zh-CN" sz="3200" b="1" dirty="0">
               <a:solidFill>

</xml_diff>